<commit_message>
Added prototype rubber band bots
See rubber_band_bot v1 > prototype_robot and prototype robot_phase2_WORKS. These programs simulate the functions of my rubber band robot while only using a button and an ultrasonic rangefinder
</commit_message>
<xml_diff>
--- a/Notes for scouts_2017 10 06.pptx
+++ b/Notes for scouts_2017 10 06.pptx
@@ -24,7 +24,7 @@
   <p:notesSz cx="6858000" cy="9144000"/>
   <p:embeddedFontLst>
     <p:embeddedFont>
-      <p:font typeface="Lato" panose="020B0604020202020204" charset="0"/>
+      <p:font typeface="Calibri" panose="020F0502020204030204" pitchFamily="34" charset="0"/>
       <p:regular r:id="rId14"/>
       <p:bold r:id="rId15"/>
       <p:italic r:id="rId16"/>
@@ -38,7 +38,7 @@
       <p:boldItalic r:id="rId21"/>
     </p:embeddedFont>
     <p:embeddedFont>
-      <p:font typeface="Calibri" panose="020F0502020204030204" pitchFamily="34" charset="0"/>
+      <p:font typeface="Lato" panose="020B0604020202020204" charset="0"/>
       <p:regular r:id="rId22"/>
       <p:bold r:id="rId23"/>
       <p:italic r:id="rId24"/>
@@ -1228,7 +1228,7 @@
           <a:p>
             <a:fld id="{1EB0A506-A1FE-44EA-B648-726E08F0C9FA}" type="datetimeFigureOut">
               <a:rPr lang="en-US" smtClean="0"/>
-              <a:t>6/13/2017</a:t>
+              <a:t>12/12/2017</a:t>
             </a:fld>
             <a:endParaRPr lang="en-US"/>
           </a:p>
@@ -1477,7 +1477,7 @@
           <a:p>
             <a:fld id="{1EB0A506-A1FE-44EA-B648-726E08F0C9FA}" type="datetimeFigureOut">
               <a:rPr lang="en-US" smtClean="0"/>
-              <a:t>6/13/2017</a:t>
+              <a:t>12/12/2017</a:t>
             </a:fld>
             <a:endParaRPr lang="en-US"/>
           </a:p>
@@ -1680,7 +1680,7 @@
           <a:p>
             <a:fld id="{1EB0A506-A1FE-44EA-B648-726E08F0C9FA}" type="datetimeFigureOut">
               <a:rPr lang="en-US" smtClean="0"/>
-              <a:t>6/13/2017</a:t>
+              <a:t>12/12/2017</a:t>
             </a:fld>
             <a:endParaRPr lang="en-US"/>
           </a:p>
@@ -2381,7 +2381,7 @@
           <a:p>
             <a:fld id="{1EB0A506-A1FE-44EA-B648-726E08F0C9FA}" type="datetimeFigureOut">
               <a:rPr lang="en-US" smtClean="0"/>
-              <a:t>6/13/2017</a:t>
+              <a:t>12/12/2017</a:t>
             </a:fld>
             <a:endParaRPr lang="en-US"/>
           </a:p>
@@ -2732,7 +2732,7 @@
           <a:p>
             <a:fld id="{1EB0A506-A1FE-44EA-B648-726E08F0C9FA}" type="datetimeFigureOut">
               <a:rPr lang="en-US" smtClean="0"/>
-              <a:t>6/13/2017</a:t>
+              <a:t>12/12/2017</a:t>
             </a:fld>
             <a:endParaRPr lang="en-US"/>
           </a:p>
@@ -3179,7 +3179,7 @@
           <a:p>
             <a:fld id="{1EB0A506-A1FE-44EA-B648-726E08F0C9FA}" type="datetimeFigureOut">
               <a:rPr lang="en-US" smtClean="0"/>
-              <a:t>6/13/2017</a:t>
+              <a:t>12/12/2017</a:t>
             </a:fld>
             <a:endParaRPr lang="en-US"/>
           </a:p>
@@ -3320,7 +3320,7 @@
           <a:p>
             <a:fld id="{1EB0A506-A1FE-44EA-B648-726E08F0C9FA}" type="datetimeFigureOut">
               <a:rPr lang="en-US" smtClean="0"/>
-              <a:t>6/13/2017</a:t>
+              <a:t>12/12/2017</a:t>
             </a:fld>
             <a:endParaRPr lang="en-US"/>
           </a:p>
@@ -3438,7 +3438,7 @@
           <a:p>
             <a:fld id="{1EB0A506-A1FE-44EA-B648-726E08F0C9FA}" type="datetimeFigureOut">
               <a:rPr lang="en-US" smtClean="0"/>
-              <a:t>6/13/2017</a:t>
+              <a:t>12/12/2017</a:t>
             </a:fld>
             <a:endParaRPr lang="en-US"/>
           </a:p>
@@ -3734,7 +3734,7 @@
           <a:p>
             <a:fld id="{1EB0A506-A1FE-44EA-B648-726E08F0C9FA}" type="datetimeFigureOut">
               <a:rPr lang="en-US" smtClean="0"/>
-              <a:t>6/13/2017</a:t>
+              <a:t>12/12/2017</a:t>
             </a:fld>
             <a:endParaRPr lang="en-US"/>
           </a:p>
@@ -4029,7 +4029,7 @@
           <a:p>
             <a:fld id="{1EB0A506-A1FE-44EA-B648-726E08F0C9FA}" type="datetimeFigureOut">
               <a:rPr lang="en-US" smtClean="0"/>
-              <a:t>6/13/2017</a:t>
+              <a:t>12/12/2017</a:t>
             </a:fld>
             <a:endParaRPr lang="en-US"/>
           </a:p>
@@ -4305,7 +4305,7 @@
           <a:p>
             <a:fld id="{1EB0A506-A1FE-44EA-B648-726E08F0C9FA}" type="datetimeFigureOut">
               <a:rPr lang="en-US" smtClean="0"/>
-              <a:t>6/13/2017</a:t>
+              <a:t>12/12/2017</a:t>
             </a:fld>
             <a:endParaRPr lang="en-US"/>
           </a:p>
@@ -6352,12 +6352,12 @@
               <a:t>The green numbers are different ways to refer to the same pin. </a:t>
             </a:r>
             <a:r>
-              <a:rPr lang="en-US" sz="1400" b="1" dirty="0" err="1">
+              <a:rPr lang="en-US" sz="1400" b="1">
                 <a:solidFill>
                   <a:srgbClr val="00B050"/>
                 </a:solidFill>
               </a:rPr>
-              <a:t>Sayin</a:t>
+              <a:t>Saying </a:t>
             </a:r>
             <a:r>
               <a:rPr lang="en-US" sz="1400" b="1" dirty="0">
@@ -6365,7 +6365,7 @@
                   <a:srgbClr val="00B050"/>
                 </a:solidFill>
               </a:rPr>
-              <a:t> pin A1 in your code (aka, Analog pin 1) is the same as saying pin 13. You can refer to that pin in your code as either one. </a:t>
+              <a:t>pin A1 in your code (aka, Analog pin 1) is the same as saying pin 13. You can refer to that pin in your code as either one. </a:t>
             </a:r>
           </a:p>
         </p:txBody>

</xml_diff>